<commit_message>
realized was using wrong data set for reconstructed pulse
</commit_message>
<xml_diff>
--- a/notes.pptx
+++ b/notes.pptx
@@ -8,7 +8,7 @@
     <p:notesMasterId r:id="rId4"/>
   </p:notesMasterIdLst>
   <p:sldIdLst>
-    <p:sldId id="256" r:id="rId2"/>
+    <p:sldId id="258" r:id="rId2"/>
     <p:sldId id="257" r:id="rId3"/>
   </p:sldIdLst>
   <p:sldSz cx="12192000" cy="6858000"/>
@@ -198,7 +198,7 @@
           <a:p>
             <a:fld id="{1DCEF498-14C0-C547-941F-E2E2D8B7C9BA}" type="datetimeFigureOut">
               <a:rPr lang="en-US" smtClean="0"/>
-              <a:t>1/7/26</a:t>
+              <a:t>1/10/26</a:t>
             </a:fld>
             <a:endParaRPr lang="en-US"/>
           </a:p>
@@ -613,7 +613,7 @@
           <a:p>
             <a:fld id="{1A4F8F35-4AEE-314D-91AA-EE5813D63096}" type="datetime1">
               <a:rPr lang="en-US" smtClean="0"/>
-              <a:t>1/7/26</a:t>
+              <a:t>1/10/26</a:t>
             </a:fld>
             <a:endParaRPr lang="en-US"/>
           </a:p>
@@ -811,7 +811,7 @@
           <a:p>
             <a:fld id="{AB641755-6080-C249-B5C7-136E08BE1798}" type="datetime1">
               <a:rPr lang="en-US" smtClean="0"/>
-              <a:t>1/7/26</a:t>
+              <a:t>1/10/26</a:t>
             </a:fld>
             <a:endParaRPr lang="en-US"/>
           </a:p>
@@ -1019,7 +1019,7 @@
           <a:p>
             <a:fld id="{E1FC2AC3-6325-A744-8902-8E09660D67E5}" type="datetime1">
               <a:rPr lang="en-US" smtClean="0"/>
-              <a:t>1/7/26</a:t>
+              <a:t>1/10/26</a:t>
             </a:fld>
             <a:endParaRPr lang="en-US"/>
           </a:p>
@@ -1189,7 +1189,7 @@
           <a:p>
             <a:fld id="{E7C129D4-5026-814E-967E-C9B9C67E0D94}" type="datetime1">
               <a:rPr lang="en-US" smtClean="0"/>
-              <a:t>1/7/26</a:t>
+              <a:t>1/10/26</a:t>
             </a:fld>
             <a:endParaRPr lang="en-US"/>
           </a:p>
@@ -1492,7 +1492,7 @@
           <a:p>
             <a:fld id="{1C470E29-259C-1C4E-947F-7A0331157271}" type="datetime1">
               <a:rPr lang="en-US" smtClean="0"/>
-              <a:t>1/7/26</a:t>
+              <a:t>1/10/26</a:t>
             </a:fld>
             <a:endParaRPr lang="en-US"/>
           </a:p>
@@ -1759,7 +1759,7 @@
           <a:p>
             <a:fld id="{941EB7AC-A1E9-4C47-8067-EC59642A799B}" type="datetime1">
               <a:rPr lang="en-US" smtClean="0"/>
-              <a:t>1/7/26</a:t>
+              <a:t>1/10/26</a:t>
             </a:fld>
             <a:endParaRPr lang="en-US"/>
           </a:p>
@@ -2139,7 +2139,7 @@
           <a:p>
             <a:fld id="{6DADF84B-4212-E346-9396-C5B80E8A50D4}" type="datetime1">
               <a:rPr lang="en-US" smtClean="0"/>
-              <a:t>1/7/26</a:t>
+              <a:t>1/10/26</a:t>
             </a:fld>
             <a:endParaRPr lang="en-US"/>
           </a:p>
@@ -2308,7 +2308,7 @@
           <a:p>
             <a:fld id="{BFB0773F-B14F-4641-87F7-0654E325BD87}" type="datetime1">
               <a:rPr lang="en-US" smtClean="0"/>
-              <a:t>1/7/26</a:t>
+              <a:t>1/10/26</a:t>
             </a:fld>
             <a:endParaRPr lang="en-US"/>
           </a:p>
@@ -2421,7 +2421,7 @@
           <a:p>
             <a:fld id="{BE856060-C7A3-9144-A3B8-F25484DEF90F}" type="datetime1">
               <a:rPr lang="en-US" smtClean="0"/>
-              <a:t>1/7/26</a:t>
+              <a:t>1/10/26</a:t>
             </a:fld>
             <a:endParaRPr lang="en-US"/>
           </a:p>
@@ -2732,7 +2732,7 @@
           <a:p>
             <a:fld id="{C297ABCD-2825-F44B-8EBB-7CF8B6DDA940}" type="datetime1">
               <a:rPr lang="en-US" smtClean="0"/>
-              <a:t>1/7/26</a:t>
+              <a:t>1/10/26</a:t>
             </a:fld>
             <a:endParaRPr lang="en-US"/>
           </a:p>
@@ -3023,7 +3023,7 @@
           <a:p>
             <a:fld id="{A6301126-EDA7-5341-9C4C-933E7FDD0D8F}" type="datetime1">
               <a:rPr lang="en-US" smtClean="0"/>
-              <a:t>1/7/26</a:t>
+              <a:t>1/10/26</a:t>
             </a:fld>
             <a:endParaRPr lang="en-US"/>
           </a:p>
@@ -3271,7 +3271,7 @@
           <a:p>
             <a:fld id="{8D4BC522-264B-5C47-AA86-81499EB26865}" type="datetime1">
               <a:rPr lang="en-US" smtClean="0"/>
-              <a:t>1/7/26</a:t>
+              <a:t>1/10/26</a:t>
             </a:fld>
             <a:endParaRPr lang="en-US"/>
           </a:p>
@@ -3694,12 +3694,66 @@
           <a:chExt cx="0" cy="0"/>
         </a:xfrm>
       </p:grpSpPr>
+      <p:sp>
+        <p:nvSpPr>
+          <p:cNvPr id="6" name="Title 5">
+            <a:extLst>
+              <a:ext uri="{FF2B5EF4-FFF2-40B4-BE49-F238E27FC236}">
+                <a16:creationId xmlns:a16="http://schemas.microsoft.com/office/drawing/2014/main" id="{FF8B14AD-9A07-6257-8F30-CD8AA8292126}"/>
+              </a:ext>
+            </a:extLst>
+          </p:cNvPr>
+          <p:cNvSpPr>
+            <a:spLocks noGrp="1"/>
+          </p:cNvSpPr>
+          <p:nvPr>
+            <p:ph type="title"/>
+          </p:nvPr>
+        </p:nvSpPr>
+        <p:spPr/>
+        <p:txBody>
+          <a:bodyPr/>
+          <a:lstStyle/>
+          <a:p>
+            <a:endParaRPr lang="en-US"/>
+          </a:p>
+        </p:txBody>
+      </p:sp>
+      <p:sp>
+        <p:nvSpPr>
+          <p:cNvPr id="3" name="Slide Number Placeholder 2">
+            <a:extLst>
+              <a:ext uri="{FF2B5EF4-FFF2-40B4-BE49-F238E27FC236}">
+                <a16:creationId xmlns:a16="http://schemas.microsoft.com/office/drawing/2014/main" id="{843836F2-0D9B-B55B-BD75-C0D659DFE226}"/>
+              </a:ext>
+            </a:extLst>
+          </p:cNvPr>
+          <p:cNvSpPr>
+            <a:spLocks noGrp="1"/>
+          </p:cNvSpPr>
+          <p:nvPr>
+            <p:ph type="sldNum" sz="quarter" idx="12"/>
+          </p:nvPr>
+        </p:nvSpPr>
+        <p:spPr/>
+        <p:txBody>
+          <a:bodyPr/>
+          <a:lstStyle/>
+          <a:p>
+            <a:fld id="{DE9CE7C4-0273-A34B-81C0-9C63783A6CA2}" type="slidenum">
+              <a:rPr lang="en-US" smtClean="0"/>
+              <a:t>1</a:t>
+            </a:fld>
+            <a:endParaRPr lang="en-US"/>
+          </a:p>
+        </p:txBody>
+      </p:sp>
       <p:pic>
         <p:nvPicPr>
-          <p:cNvPr id="8" name="Picture 7">
-            <a:extLst>
-              <a:ext uri="{FF2B5EF4-FFF2-40B4-BE49-F238E27FC236}">
-                <a16:creationId xmlns:a16="http://schemas.microsoft.com/office/drawing/2014/main" id="{640131A5-915A-1C94-F5FE-627B754D9B46}"/>
+          <p:cNvPr id="7" name="Picture 6">
+            <a:extLst>
+              <a:ext uri="{FF2B5EF4-FFF2-40B4-BE49-F238E27FC236}">
+                <a16:creationId xmlns:a16="http://schemas.microsoft.com/office/drawing/2014/main" id="{78F12898-1EE2-ABB3-094D-4DA9DCE53737}"/>
               </a:ext>
             </a:extLst>
           </p:cNvPr>
@@ -3716,38 +3770,8 @@
         </p:blipFill>
         <p:spPr>
           <a:xfrm>
-            <a:off x="466061" y="581719"/>
-            <a:ext cx="5201092" cy="3582974"/>
-          </a:xfrm>
-          <a:prstGeom prst="rect">
-            <a:avLst/>
-          </a:prstGeom>
-        </p:spPr>
-      </p:pic>
-      <p:pic>
-        <p:nvPicPr>
-          <p:cNvPr id="9" name="Picture 8">
-            <a:extLst>
-              <a:ext uri="{FF2B5EF4-FFF2-40B4-BE49-F238E27FC236}">
-                <a16:creationId xmlns:a16="http://schemas.microsoft.com/office/drawing/2014/main" id="{35995AD0-2B21-9A1A-4349-63CD9E0F9FC1}"/>
-              </a:ext>
-            </a:extLst>
-          </p:cNvPr>
-          <p:cNvPicPr>
-            <a:picLocks noChangeAspect="1"/>
-          </p:cNvPicPr>
-          <p:nvPr/>
-        </p:nvPicPr>
-        <p:blipFill>
-          <a:blip r:embed="rId3"/>
-          <a:stretch>
-            <a:fillRect/>
-          </a:stretch>
-        </p:blipFill>
-        <p:spPr>
-          <a:xfrm>
-            <a:off x="6193246" y="581719"/>
-            <a:ext cx="5201093" cy="3595817"/>
+            <a:off x="1376422" y="863303"/>
+            <a:ext cx="5761299" cy="4320974"/>
           </a:xfrm>
           <a:prstGeom prst="rect">
             <a:avLst/>
@@ -3758,10 +3782,10 @@
         <mc:Choice xmlns:a14="http://schemas.microsoft.com/office/drawing/2010/main" Requires="a14">
           <p:sp>
             <p:nvSpPr>
-              <p:cNvPr id="10" name="TextBox 9">
+              <p:cNvPr id="8" name="TextBox 7">
                 <a:extLst>
                   <a:ext uri="{FF2B5EF4-FFF2-40B4-BE49-F238E27FC236}">
-                    <a16:creationId xmlns:a16="http://schemas.microsoft.com/office/drawing/2014/main" id="{88CABB9C-8132-6D12-0B70-7F92F239E87B}"/>
+                    <a16:creationId xmlns:a16="http://schemas.microsoft.com/office/drawing/2014/main" id="{4558B9C7-A7FB-F69C-AD7F-7E07480B2E3C}"/>
                   </a:ext>
                 </a:extLst>
               </p:cNvPr>
@@ -3770,8 +3794,8 @@
             </p:nvSpPr>
             <p:spPr>
               <a:xfrm>
-                <a:off x="6354048" y="4177536"/>
-                <a:ext cx="5040291" cy="1477328"/>
+                <a:off x="7535119" y="1192192"/>
+                <a:ext cx="3493520" cy="369332"/>
               </a:xfrm>
               <a:prstGeom prst="rect">
                 <a:avLst/>
@@ -3784,49 +3808,9 @@
               </a:bodyPr>
               <a:lstStyle/>
               <a:p>
-                <a:pPr marL="285750" indent="-285750">
-                  <a:buFont typeface="Arial" panose="020B0604020202020204" pitchFamily="34" charset="0"/>
-                  <a:buChar char="•"/>
-                </a:pPr>
                 <a:r>
                   <a:rPr lang="en-US" dirty="0"/>
-                  <a:t>1.7 W, 200 MHz (8.5 </a:t>
-                </a:r>
-                <a:r>
-                  <a:rPr lang="en-US" dirty="0" err="1"/>
-                  <a:t>nJ</a:t>
-                </a:r>
-                <a:r>
-                  <a:rPr lang="en-US" dirty="0"/>
-                  <a:t>)</a:t>
-                </a:r>
-              </a:p>
-              <a:p>
-                <a:pPr marL="285750" indent="-285750">
-                  <a:buFont typeface="Arial" panose="020B0604020202020204" pitchFamily="34" charset="0"/>
-                  <a:buChar char="•"/>
-                </a:pPr>
-                <a:r>
-                  <a:rPr lang="en-US" dirty="0"/>
-                  <a:t>70% coupling efficiency into PM-1550 (5.95 </a:t>
-                </a:r>
-                <a:r>
-                  <a:rPr lang="en-US" dirty="0" err="1"/>
-                  <a:t>nJ</a:t>
-                </a:r>
-                <a:r>
-                  <a:rPr lang="en-US" dirty="0"/>
-                  <a:t>)</a:t>
-                </a:r>
-              </a:p>
-              <a:p>
-                <a:pPr marL="285750" indent="-285750">
-                  <a:buFont typeface="Arial" panose="020B0604020202020204" pitchFamily="34" charset="0"/>
-                  <a:buChar char="•"/>
-                </a:pPr>
-                <a:r>
-                  <a:rPr lang="en-US" dirty="0"/>
-                  <a:t>1dB splicing loss PM-1550 </a:t>
+                  <a:t>5.5 cm PM-1550 </a:t>
                 </a:r>
                 <a14:m>
                   <m:oMath xmlns:m="http://schemas.openxmlformats.org/officeDocument/2006/math">
@@ -3840,46 +3824,7 @@
                 </a14:m>
                 <a:r>
                   <a:rPr lang="en-US" dirty="0"/>
-                  <a:t> HNLF (4.73 </a:t>
-                </a:r>
-                <a:r>
-                  <a:rPr lang="en-US" dirty="0" err="1"/>
-                  <a:t>nJ</a:t>
-                </a:r>
-                <a:r>
-                  <a:rPr lang="en-US" dirty="0"/>
-                  <a:t>)</a:t>
-                </a:r>
-              </a:p>
-              <a:p>
-                <a:pPr marL="285750" indent="-285750">
-                  <a:buFont typeface="Arial" panose="020B0604020202020204" pitchFamily="34" charset="0"/>
-                  <a:buChar char="•"/>
-                </a:pPr>
-                <a:endParaRPr lang="en-US" dirty="0"/>
-              </a:p>
-              <a:p>
-                <a:pPr marL="285750" indent="-285750">
-                  <a:buFont typeface="Arial" panose="020B0604020202020204" pitchFamily="34" charset="0"/>
-                  <a:buChar char="•"/>
-                </a:pPr>
-                <a:r>
-                  <a:rPr lang="en-US" dirty="0"/>
-                  <a:t>15cm PM-1550 </a:t>
-                </a:r>
-                <a14:m>
-                  <m:oMath xmlns:m="http://schemas.openxmlformats.org/officeDocument/2006/math">
-                    <m:r>
-                      <a:rPr lang="en-US" b="0" i="1" smtClean="0">
-                        <a:latin typeface="Cambria Math" panose="02040503050406030204" pitchFamily="18" charset="0"/>
-                      </a:rPr>
-                      <m:t>→</m:t>
-                    </m:r>
-                  </m:oMath>
-                </a14:m>
-                <a:r>
-                  <a:rPr lang="en-US" dirty="0"/>
-                  <a:t> 4.24 cm AD-HNLF</a:t>
+                  <a:t> 2cm AD-HNLF</a:t>
                 </a:r>
               </a:p>
             </p:txBody>
@@ -3888,10 +3833,10 @@
         <mc:Fallback>
           <p:sp>
             <p:nvSpPr>
-              <p:cNvPr id="10" name="TextBox 9">
+              <p:cNvPr id="8" name="TextBox 7">
                 <a:extLst>
                   <a:ext uri="{FF2B5EF4-FFF2-40B4-BE49-F238E27FC236}">
-                    <a16:creationId xmlns:a16="http://schemas.microsoft.com/office/drawing/2014/main" id="{88CABB9C-8132-6D12-0B70-7F92F239E87B}"/>
+                    <a16:creationId xmlns:a16="http://schemas.microsoft.com/office/drawing/2014/main" id="{4558B9C7-A7FB-F69C-AD7F-7E07480B2E3C}"/>
                   </a:ext>
                 </a:extLst>
               </p:cNvPr>
@@ -3902,16 +3847,16 @@
             </p:nvSpPr>
             <p:spPr>
               <a:xfrm>
-                <a:off x="6354048" y="4177536"/>
-                <a:ext cx="5040291" cy="1477328"/>
+                <a:off x="7535119" y="1192192"/>
+                <a:ext cx="3493520" cy="369332"/>
               </a:xfrm>
               <a:prstGeom prst="rect">
                 <a:avLst/>
               </a:prstGeom>
               <a:blipFill>
-                <a:blip r:embed="rId4"/>
+                <a:blip r:embed="rId3"/>
                 <a:stretch>
-                  <a:fillRect l="-754" t="-1695" b="-5085"/>
+                  <a:fillRect l="-1449" t="-10345" r="-362" b="-27586"/>
                 </a:stretch>
               </a:blipFill>
             </p:spPr>
@@ -3930,166 +3875,51 @@
           </p:sp>
         </mc:Fallback>
       </mc:AlternateContent>
-      <mc:AlternateContent xmlns:mc="http://schemas.openxmlformats.org/markup-compatibility/2006">
-        <mc:Choice xmlns:a14="http://schemas.microsoft.com/office/drawing/2010/main" Requires="a14">
-          <p:sp>
-            <p:nvSpPr>
-              <p:cNvPr id="11" name="TextBox 10">
-                <a:extLst>
-                  <a:ext uri="{FF2B5EF4-FFF2-40B4-BE49-F238E27FC236}">
-                    <a16:creationId xmlns:a16="http://schemas.microsoft.com/office/drawing/2014/main" id="{1D0BADA3-0D1D-A06A-25AF-8194A2CE260C}"/>
-                  </a:ext>
-                </a:extLst>
-              </p:cNvPr>
-              <p:cNvSpPr txBox="1"/>
-              <p:nvPr/>
-            </p:nvSpPr>
-            <p:spPr>
-              <a:xfrm>
-                <a:off x="909232" y="4177536"/>
-                <a:ext cx="4075411" cy="1200329"/>
-              </a:xfrm>
-              <a:prstGeom prst="rect">
-                <a:avLst/>
-              </a:prstGeom>
-              <a:noFill/>
-            </p:spPr>
-            <p:txBody>
-              <a:bodyPr wrap="none" rtlCol="0">
-                <a:spAutoFit/>
-              </a:bodyPr>
-              <a:lstStyle/>
-              <a:p>
-                <a:pPr marL="285750" indent="-285750">
-                  <a:buFont typeface="Arial" panose="020B0604020202020204" pitchFamily="34" charset="0"/>
-                  <a:buChar char="•"/>
-                </a:pPr>
-                <a:r>
-                  <a:rPr lang="en-US" dirty="0"/>
-                  <a:t>1.7 W, 200 MHz (8.5 </a:t>
-                </a:r>
-                <a:r>
-                  <a:rPr lang="en-US" dirty="0" err="1"/>
-                  <a:t>nJ</a:t>
-                </a:r>
-                <a:r>
-                  <a:rPr lang="en-US" dirty="0"/>
-                  <a:t>)</a:t>
-                </a:r>
-              </a:p>
-              <a:p>
-                <a:pPr marL="285750" indent="-285750">
-                  <a:buFont typeface="Arial" panose="020B0604020202020204" pitchFamily="34" charset="0"/>
-                  <a:buChar char="•"/>
-                </a:pPr>
-                <a:r>
-                  <a:rPr lang="en-US" dirty="0"/>
-                  <a:t>No coupling or splicing loss</a:t>
-                </a:r>
-              </a:p>
-              <a:p>
-                <a:pPr marL="285750" indent="-285750">
-                  <a:buFont typeface="Arial" panose="020B0604020202020204" pitchFamily="34" charset="0"/>
-                  <a:buChar char="•"/>
-                </a:pPr>
-                <a:endParaRPr lang="en-US" dirty="0"/>
-              </a:p>
-              <a:p>
-                <a:pPr marL="285750" indent="-285750">
-                  <a:buFont typeface="Arial" panose="020B0604020202020204" pitchFamily="34" charset="0"/>
-                  <a:buChar char="•"/>
-                </a:pPr>
-                <a:r>
-                  <a:rPr lang="en-US" dirty="0"/>
-                  <a:t>11.84 cm PM-1550 </a:t>
-                </a:r>
-                <a14:m>
-                  <m:oMath xmlns:m="http://schemas.openxmlformats.org/officeDocument/2006/math">
-                    <m:r>
-                      <a:rPr lang="en-US" b="0" i="1" smtClean="0">
-                        <a:latin typeface="Cambria Math" panose="02040503050406030204" pitchFamily="18" charset="0"/>
-                      </a:rPr>
-                      <m:t>→</m:t>
-                    </m:r>
-                  </m:oMath>
-                </a14:m>
-                <a:r>
-                  <a:rPr lang="en-US" dirty="0"/>
-                  <a:t> 3 cm AD-HNLF</a:t>
-                </a:r>
-              </a:p>
-            </p:txBody>
-          </p:sp>
-        </mc:Choice>
-        <mc:Fallback>
-          <p:sp>
-            <p:nvSpPr>
-              <p:cNvPr id="11" name="TextBox 10">
-                <a:extLst>
-                  <a:ext uri="{FF2B5EF4-FFF2-40B4-BE49-F238E27FC236}">
-                    <a16:creationId xmlns:a16="http://schemas.microsoft.com/office/drawing/2014/main" id="{1D0BADA3-0D1D-A06A-25AF-8194A2CE260C}"/>
-                  </a:ext>
-                </a:extLst>
-              </p:cNvPr>
-              <p:cNvSpPr txBox="1">
-                <a:spLocks noRot="1" noChangeAspect="1" noMove="1" noResize="1" noEditPoints="1" noAdjustHandles="1" noChangeArrowheads="1" noChangeShapeType="1" noTextEdit="1"/>
-              </p:cNvSpPr>
-              <p:nvPr/>
-            </p:nvSpPr>
-            <p:spPr>
-              <a:xfrm>
-                <a:off x="909232" y="4177536"/>
-                <a:ext cx="4075411" cy="1200329"/>
-              </a:xfrm>
-              <a:prstGeom prst="rect">
-                <a:avLst/>
-              </a:prstGeom>
-              <a:blipFill>
-                <a:blip r:embed="rId5"/>
-                <a:stretch>
-                  <a:fillRect l="-932" t="-2083" r="-311" b="-7292"/>
-                </a:stretch>
-              </a:blipFill>
-            </p:spPr>
-            <p:txBody>
-              <a:bodyPr/>
-              <a:lstStyle/>
-              <a:p>
-                <a:r>
-                  <a:rPr lang="en-US">
-                    <a:noFill/>
-                  </a:rPr>
-                  <a:t> </a:t>
-                </a:r>
-              </a:p>
-            </p:txBody>
-          </p:sp>
-        </mc:Fallback>
-      </mc:AlternateContent>
-      <p:sp>
-        <p:nvSpPr>
-          <p:cNvPr id="12" name="Title 11">
-            <a:extLst>
-              <a:ext uri="{FF2B5EF4-FFF2-40B4-BE49-F238E27FC236}">
-                <a16:creationId xmlns:a16="http://schemas.microsoft.com/office/drawing/2014/main" id="{DB86706E-F0CE-F3B1-3B6A-BD8AF29B52EA}"/>
-              </a:ext>
-            </a:extLst>
-          </p:cNvPr>
-          <p:cNvSpPr>
-            <a:spLocks noGrp="1"/>
-          </p:cNvSpPr>
-          <p:nvPr>
-            <p:ph type="title"/>
-          </p:nvPr>
-        </p:nvSpPr>
-        <p:spPr/>
-        <p:txBody>
-          <a:bodyPr/>
-          <a:lstStyle/>
-          <a:p>
+      <p:sp>
+        <p:nvSpPr>
+          <p:cNvPr id="9" name="TextBox 8">
+            <a:extLst>
+              <a:ext uri="{FF2B5EF4-FFF2-40B4-BE49-F238E27FC236}">
+                <a16:creationId xmlns:a16="http://schemas.microsoft.com/office/drawing/2014/main" id="{C49B7C5C-067F-70D9-7841-5BAC095FAE51}"/>
+              </a:ext>
+            </a:extLst>
+          </p:cNvPr>
+          <p:cNvSpPr txBox="1"/>
+          <p:nvPr/>
+        </p:nvSpPr>
+        <p:spPr>
+          <a:xfrm>
+            <a:off x="7534155" y="1643604"/>
+            <a:ext cx="3819645" cy="646331"/>
+          </a:xfrm>
+          <a:prstGeom prst="rect">
+            <a:avLst/>
+          </a:prstGeom>
+          <a:noFill/>
+        </p:spPr>
+        <p:txBody>
+          <a:bodyPr wrap="square" rtlCol="0">
+            <a:spAutoFit/>
+          </a:bodyPr>
+          <a:lstStyle/>
+          <a:p>
+            <a:pPr marL="285750" indent="-285750">
+              <a:buFont typeface="Arial" panose="020B0604020202020204" pitchFamily="34" charset="0"/>
+              <a:buChar char="•"/>
+            </a:pPr>
             <a:r>
               <a:rPr lang="en-US" dirty="0"/>
-              <a:t>Simulation Examples</a:t>
+              <a:t>1.04W coupled into PM-1550</a:t>
+            </a:r>
+          </a:p>
+          <a:p>
+            <a:pPr marL="285750" indent="-285750">
+              <a:buFont typeface="Arial" panose="020B0604020202020204" pitchFamily="34" charset="0"/>
+              <a:buChar char="•"/>
+            </a:pPr>
+            <a:r>
+              <a:rPr lang="en-US" dirty="0"/>
+              <a:t>1dB splicing loss to AD-HNLF</a:t>
             </a:r>
           </a:p>
         </p:txBody>
@@ -4097,7 +3927,7 @@
     </p:spTree>
     <p:extLst>
       <p:ext uri="{BB962C8B-B14F-4D97-AF65-F5344CB8AC3E}">
-        <p14:creationId xmlns:p14="http://schemas.microsoft.com/office/powerpoint/2010/main" val="2066420830"/>
+        <p14:creationId xmlns:p14="http://schemas.microsoft.com/office/powerpoint/2010/main" val="4029534652"/>
       </p:ext>
     </p:extLst>
   </p:cSld>

</xml_diff>